<commit_message>
Deploy website - based on 4a90ad52d851276221ead73dac0a476c4d0b0b59
</commit_message>
<xml_diff>
--- a/img/develop/release-1.0/ggc-architecture.pptx
+++ b/img/develop/release-1.0/ggc-architecture.pptx
@@ -259,7 +259,7 @@
           <a:p>
             <a:fld id="{CCCF0BBA-FA6C-2145-A1B4-03034CCEF0F6}" type="datetimeFigureOut">
               <a:rPr lang="en-US" smtClean="0"/>
-              <a:t>4/27/23</a:t>
+              <a:t>11/5/24</a:t>
             </a:fld>
             <a:endParaRPr lang="en-US"/>
           </a:p>
@@ -457,7 +457,7 @@
           <a:p>
             <a:fld id="{CCCF0BBA-FA6C-2145-A1B4-03034CCEF0F6}" type="datetimeFigureOut">
               <a:rPr lang="en-US" smtClean="0"/>
-              <a:t>4/27/23</a:t>
+              <a:t>11/5/24</a:t>
             </a:fld>
             <a:endParaRPr lang="en-US"/>
           </a:p>
@@ -665,7 +665,7 @@
           <a:p>
             <a:fld id="{CCCF0BBA-FA6C-2145-A1B4-03034CCEF0F6}" type="datetimeFigureOut">
               <a:rPr lang="en-US" smtClean="0"/>
-              <a:t>4/27/23</a:t>
+              <a:t>11/5/24</a:t>
             </a:fld>
             <a:endParaRPr lang="en-US"/>
           </a:p>
@@ -863,7 +863,7 @@
           <a:p>
             <a:fld id="{CCCF0BBA-FA6C-2145-A1B4-03034CCEF0F6}" type="datetimeFigureOut">
               <a:rPr lang="en-US" smtClean="0"/>
-              <a:t>4/27/23</a:t>
+              <a:t>11/5/24</a:t>
             </a:fld>
             <a:endParaRPr lang="en-US"/>
           </a:p>
@@ -1138,7 +1138,7 @@
           <a:p>
             <a:fld id="{CCCF0BBA-FA6C-2145-A1B4-03034CCEF0F6}" type="datetimeFigureOut">
               <a:rPr lang="en-US" smtClean="0"/>
-              <a:t>4/27/23</a:t>
+              <a:t>11/5/24</a:t>
             </a:fld>
             <a:endParaRPr lang="en-US"/>
           </a:p>
@@ -1403,7 +1403,7 @@
           <a:p>
             <a:fld id="{CCCF0BBA-FA6C-2145-A1B4-03034CCEF0F6}" type="datetimeFigureOut">
               <a:rPr lang="en-US" smtClean="0"/>
-              <a:t>4/27/23</a:t>
+              <a:t>11/5/24</a:t>
             </a:fld>
             <a:endParaRPr lang="en-US"/>
           </a:p>
@@ -1815,7 +1815,7 @@
           <a:p>
             <a:fld id="{CCCF0BBA-FA6C-2145-A1B4-03034CCEF0F6}" type="datetimeFigureOut">
               <a:rPr lang="en-US" smtClean="0"/>
-              <a:t>4/27/23</a:t>
+              <a:t>11/5/24</a:t>
             </a:fld>
             <a:endParaRPr lang="en-US"/>
           </a:p>
@@ -1956,7 +1956,7 @@
           <a:p>
             <a:fld id="{CCCF0BBA-FA6C-2145-A1B4-03034CCEF0F6}" type="datetimeFigureOut">
               <a:rPr lang="en-US" smtClean="0"/>
-              <a:t>4/27/23</a:t>
+              <a:t>11/5/24</a:t>
             </a:fld>
             <a:endParaRPr lang="en-US"/>
           </a:p>
@@ -2069,7 +2069,7 @@
           <a:p>
             <a:fld id="{CCCF0BBA-FA6C-2145-A1B4-03034CCEF0F6}" type="datetimeFigureOut">
               <a:rPr lang="en-US" smtClean="0"/>
-              <a:t>4/27/23</a:t>
+              <a:t>11/5/24</a:t>
             </a:fld>
             <a:endParaRPr lang="en-US"/>
           </a:p>
@@ -2380,7 +2380,7 @@
           <a:p>
             <a:fld id="{CCCF0BBA-FA6C-2145-A1B4-03034CCEF0F6}" type="datetimeFigureOut">
               <a:rPr lang="en-US" smtClean="0"/>
-              <a:t>4/27/23</a:t>
+              <a:t>11/5/24</a:t>
             </a:fld>
             <a:endParaRPr lang="en-US"/>
           </a:p>
@@ -2668,7 +2668,7 @@
           <a:p>
             <a:fld id="{CCCF0BBA-FA6C-2145-A1B4-03034CCEF0F6}" type="datetimeFigureOut">
               <a:rPr lang="en-US" smtClean="0"/>
-              <a:t>4/27/23</a:t>
+              <a:t>11/5/24</a:t>
             </a:fld>
             <a:endParaRPr lang="en-US"/>
           </a:p>
@@ -2909,7 +2909,7 @@
           <a:p>
             <a:fld id="{CCCF0BBA-FA6C-2145-A1B4-03034CCEF0F6}" type="datetimeFigureOut">
               <a:rPr lang="en-US" smtClean="0"/>
-              <a:t>4/27/23</a:t>
+              <a:t>11/5/24</a:t>
             </a:fld>
             <a:endParaRPr lang="en-US"/>
           </a:p>
@@ -3424,8 +3424,8 @@
         </p:nvSpPr>
         <p:spPr>
           <a:xfrm>
-            <a:off x="1302327" y="578069"/>
-            <a:ext cx="10058400" cy="4215604"/>
+            <a:off x="1302327" y="198446"/>
+            <a:ext cx="10058400" cy="4713973"/>
           </a:xfrm>
           <a:prstGeom prst="rect">
             <a:avLst/>
@@ -3677,15 +3677,15 @@
         </p:nvCxnSpPr>
         <p:spPr>
           <a:xfrm>
-            <a:off x="6082145" y="4793673"/>
-            <a:ext cx="1090" cy="979972"/>
+            <a:off x="5971786" y="4912419"/>
+            <a:ext cx="0" cy="890425"/>
           </a:xfrm>
           <a:prstGeom prst="straightConnector1">
             <a:avLst/>
           </a:prstGeom>
           <a:ln w="25400">
             <a:solidFill>
-              <a:schemeClr val="accent1"/>
+              <a:srgbClr val="C00000"/>
             </a:solidFill>
             <a:headEnd type="triangle"/>
             <a:tailEnd type="triangle"/>
@@ -3722,7 +3722,7 @@
         </p:nvSpPr>
         <p:spPr>
           <a:xfrm>
-            <a:off x="5735392" y="5066875"/>
+            <a:off x="5555283" y="5097215"/>
             <a:ext cx="1973079" cy="644142"/>
           </a:xfrm>
           <a:prstGeom prst="rect">
@@ -4542,7 +4542,7 @@
         </p:nvSpPr>
         <p:spPr>
           <a:xfrm>
-            <a:off x="8439031" y="5983910"/>
+            <a:off x="7990372" y="5983910"/>
             <a:ext cx="1648691" cy="481492"/>
           </a:xfrm>
           <a:prstGeom prst="rect">
@@ -4748,7 +4748,7 @@
         </p:nvSpPr>
         <p:spPr>
           <a:xfrm>
-            <a:off x="6841639" y="5952784"/>
+            <a:off x="6698838" y="5970591"/>
             <a:ext cx="1973079" cy="644142"/>
           </a:xfrm>
           <a:prstGeom prst="rect">
@@ -4948,7 +4948,7 @@
         </p:nvGrpSpPr>
         <p:grpSpPr>
           <a:xfrm>
-            <a:off x="1594867" y="3778238"/>
+            <a:off x="1594867" y="3998948"/>
             <a:ext cx="9396607" cy="757546"/>
             <a:chOff x="1728593" y="2109355"/>
             <a:chExt cx="9396607" cy="757546"/>
@@ -5638,7 +5638,7 @@
         </p:nvGrpSpPr>
         <p:grpSpPr>
           <a:xfrm>
-            <a:off x="1589171" y="1980630"/>
+            <a:off x="1589171" y="1654820"/>
             <a:ext cx="9396607" cy="720530"/>
             <a:chOff x="1728593" y="2109355"/>
             <a:chExt cx="9396607" cy="720530"/>
@@ -6119,7 +6119,7 @@
         </p:nvGrpSpPr>
         <p:grpSpPr>
           <a:xfrm>
-            <a:off x="1587764" y="948772"/>
+            <a:off x="1587764" y="360212"/>
             <a:ext cx="9396607" cy="850143"/>
             <a:chOff x="1728593" y="2109354"/>
             <a:chExt cx="9396607" cy="850143"/>
@@ -6812,7 +6812,7 @@
         </p:nvSpPr>
         <p:spPr>
           <a:xfrm>
-            <a:off x="1589171" y="1982314"/>
+            <a:off x="1589171" y="1656504"/>
             <a:ext cx="1133008" cy="718845"/>
           </a:xfrm>
           <a:prstGeom prst="rect">
@@ -7022,7 +7022,7 @@
         </p:nvSpPr>
         <p:spPr>
           <a:xfrm>
-            <a:off x="1594867" y="3810552"/>
+            <a:off x="1594867" y="4031262"/>
             <a:ext cx="1535293" cy="718845"/>
           </a:xfrm>
           <a:prstGeom prst="rect">
@@ -7911,6 +7911,141 @@
           </a:p>
         </p:txBody>
       </p:sp>
+      <p:cxnSp>
+        <p:nvCxnSpPr>
+          <p:cNvPr id="36" name="Straight Arrow Connector 35">
+            <a:extLst>
+              <a:ext uri="{FF2B5EF4-FFF2-40B4-BE49-F238E27FC236}">
+                <a16:creationId xmlns:a16="http://schemas.microsoft.com/office/drawing/2014/main" id="{C266CD7D-D4F0-D7C8-41BC-249720D76CAC}"/>
+              </a:ext>
+            </a:extLst>
+          </p:cNvPr>
+          <p:cNvCxnSpPr>
+            <a:cxnSpLocks/>
+          </p:cNvCxnSpPr>
+          <p:nvPr/>
+        </p:nvCxnSpPr>
+        <p:spPr>
+          <a:xfrm>
+            <a:off x="5985641" y="3586049"/>
+            <a:ext cx="0" cy="445213"/>
+          </a:xfrm>
+          <a:prstGeom prst="straightConnector1">
+            <a:avLst/>
+          </a:prstGeom>
+          <a:ln w="25400">
+            <a:solidFill>
+              <a:srgbClr val="C00000"/>
+            </a:solidFill>
+            <a:headEnd type="triangle"/>
+            <a:tailEnd type="triangle"/>
+          </a:ln>
+        </p:spPr>
+        <p:style>
+          <a:lnRef idx="1">
+            <a:schemeClr val="accent1"/>
+          </a:lnRef>
+          <a:fillRef idx="0">
+            <a:schemeClr val="accent1"/>
+          </a:fillRef>
+          <a:effectRef idx="0">
+            <a:schemeClr val="accent1"/>
+          </a:effectRef>
+          <a:fontRef idx="minor">
+            <a:schemeClr val="tx1"/>
+          </a:fontRef>
+        </p:style>
+      </p:cxnSp>
+      <p:cxnSp>
+        <p:nvCxnSpPr>
+          <p:cNvPr id="38" name="Straight Arrow Connector 37">
+            <a:extLst>
+              <a:ext uri="{FF2B5EF4-FFF2-40B4-BE49-F238E27FC236}">
+                <a16:creationId xmlns:a16="http://schemas.microsoft.com/office/drawing/2014/main" id="{FFB3A614-259F-B97C-EBA4-9D51415041A2}"/>
+              </a:ext>
+            </a:extLst>
+          </p:cNvPr>
+          <p:cNvCxnSpPr>
+            <a:cxnSpLocks/>
+          </p:cNvCxnSpPr>
+          <p:nvPr/>
+        </p:nvCxnSpPr>
+        <p:spPr>
+          <a:xfrm>
+            <a:off x="5985641" y="2375349"/>
+            <a:ext cx="0" cy="445213"/>
+          </a:xfrm>
+          <a:prstGeom prst="straightConnector1">
+            <a:avLst/>
+          </a:prstGeom>
+          <a:ln w="25400">
+            <a:solidFill>
+              <a:srgbClr val="C00000"/>
+            </a:solidFill>
+            <a:headEnd type="triangle"/>
+            <a:tailEnd type="triangle"/>
+          </a:ln>
+        </p:spPr>
+        <p:style>
+          <a:lnRef idx="1">
+            <a:schemeClr val="accent1"/>
+          </a:lnRef>
+          <a:fillRef idx="0">
+            <a:schemeClr val="accent1"/>
+          </a:fillRef>
+          <a:effectRef idx="0">
+            <a:schemeClr val="accent1"/>
+          </a:effectRef>
+          <a:fontRef idx="minor">
+            <a:schemeClr val="tx1"/>
+          </a:fontRef>
+        </p:style>
+      </p:cxnSp>
+      <p:cxnSp>
+        <p:nvCxnSpPr>
+          <p:cNvPr id="39" name="Straight Arrow Connector 38">
+            <a:extLst>
+              <a:ext uri="{FF2B5EF4-FFF2-40B4-BE49-F238E27FC236}">
+                <a16:creationId xmlns:a16="http://schemas.microsoft.com/office/drawing/2014/main" id="{30521BFB-754D-9807-E053-AE06D8E698F0}"/>
+              </a:ext>
+            </a:extLst>
+          </p:cNvPr>
+          <p:cNvCxnSpPr>
+            <a:cxnSpLocks/>
+          </p:cNvCxnSpPr>
+          <p:nvPr/>
+        </p:nvCxnSpPr>
+        <p:spPr>
+          <a:xfrm>
+            <a:off x="6017172" y="1210355"/>
+            <a:ext cx="0" cy="445213"/>
+          </a:xfrm>
+          <a:prstGeom prst="straightConnector1">
+            <a:avLst/>
+          </a:prstGeom>
+          <a:ln w="25400">
+            <a:solidFill>
+              <a:srgbClr val="C00000"/>
+            </a:solidFill>
+            <a:headEnd type="triangle"/>
+            <a:tailEnd type="triangle"/>
+          </a:ln>
+        </p:spPr>
+        <p:style>
+          <a:lnRef idx="1">
+            <a:schemeClr val="accent1"/>
+          </a:lnRef>
+          <a:fillRef idx="0">
+            <a:schemeClr val="accent1"/>
+          </a:fillRef>
+          <a:effectRef idx="0">
+            <a:schemeClr val="accent1"/>
+          </a:effectRef>
+          <a:fontRef idx="minor">
+            <a:schemeClr val="tx1"/>
+          </a:fontRef>
+        </p:style>
+      </p:cxnSp>
     </p:spTree>
     <p:extLst>
       <p:ext uri="{BB962C8B-B14F-4D97-AF65-F5344CB8AC3E}">

</xml_diff>